<commit_message>
have to change function
</commit_message>
<xml_diff>
--- a/PPT/개인 연구 Simulink.pptx
+++ b/PPT/개인 연구 Simulink.pptx
@@ -230,7 +230,7 @@
           <a:p>
             <a:fld id="{D1DA2BEC-7E6F-47A9-9115-3EED439C6DA5}" type="datetimeFigureOut">
               <a:rPr lang="ko-KR" altLang="en-US" smtClean="0"/>
-              <a:t>2024-01-18</a:t>
+              <a:t>2024-02-15</a:t>
             </a:fld>
             <a:endParaRPr lang="ko-KR" altLang="en-US"/>
           </a:p>
@@ -408,7 +408,7 @@
           <a:p>
             <a:fld id="{BF98C93F-AAD7-4410-AA25-972027873478}" type="datetimeFigureOut">
               <a:rPr lang="ko-KR" altLang="en-US" smtClean="0"/>
-              <a:t>2024-01-18</a:t>
+              <a:t>2024-02-15</a:t>
             </a:fld>
             <a:endParaRPr lang="ko-KR" altLang="en-US"/>
           </a:p>

</xml_diff>